<commit_message>
Changed crs to crsName
Changed crs to crsName
</commit_message>
<xml_diff>
--- a/documentation/DD-API-2.0-resource-objects.pptx
+++ b/documentation/DD-API-2.0-resource-objects.pptx
@@ -107,6 +107,36 @@
       </a:defRPr>
     </a:lvl9pPr>
   </p:defaultTextStyle>
+  <p:extLst>
+    <p:ext uri="{EFAFB233-063F-42B5-8137-9DF3F51BA10A}">
+      <p15:sldGuideLst xmlns:p15="http://schemas.microsoft.com/office/powerpoint/2012/main">
+        <p15:guide id="1" orient="horz" pos="3024">
+          <p15:clr>
+            <a:srgbClr val="A4A3A4"/>
+          </p15:clr>
+        </p15:guide>
+        <p15:guide id="2" pos="4032">
+          <p15:clr>
+            <a:srgbClr val="A4A3A4"/>
+          </p15:clr>
+        </p15:guide>
+      </p15:sldGuideLst>
+    </p:ext>
+    <p:ext uri="{2D200454-40CA-4A62-9FC3-DE9A4176ACB9}">
+      <p15:notesGuideLst xmlns:p15="http://schemas.microsoft.com/office/powerpoint/2012/main">
+        <p15:guide id="1" orient="horz" pos="2880">
+          <p15:clr>
+            <a:srgbClr val="A4A3A4"/>
+          </p15:clr>
+        </p15:guide>
+        <p15:guide id="2" pos="2160">
+          <p15:clr>
+            <a:srgbClr val="A4A3A4"/>
+          </p15:clr>
+        </p15:guide>
+      </p15:notesGuideLst>
+    </p:ext>
+  </p:extLst>
 </p:presentation>
 </file>
 
@@ -192,7 +222,7 @@
           <a:p>
             <a:fld id="{C5B82782-F686-4554-930A-147097EB8850}" type="datetimeFigureOut">
               <a:rPr lang="en-GB" smtClean="0"/>
-              <a:t>06/08/2018</a:t>
+              <a:t>16/01/2019</a:t>
             </a:fld>
             <a:endParaRPr lang="en-GB" dirty="0"/>
           </a:p>
@@ -256,35 +286,35 @@
           <a:p>
             <a:pPr lvl="0"/>
             <a:r>
-              <a:rPr lang="en-US" smtClean="0"/>
+              <a:rPr lang="en-US"/>
               <a:t>Click to edit Master text styles</a:t>
             </a:r>
           </a:p>
           <a:p>
             <a:pPr lvl="1"/>
             <a:r>
-              <a:rPr lang="en-US" smtClean="0"/>
+              <a:rPr lang="en-US"/>
               <a:t>Second level</a:t>
             </a:r>
           </a:p>
           <a:p>
             <a:pPr lvl="2"/>
             <a:r>
-              <a:rPr lang="en-US" smtClean="0"/>
+              <a:rPr lang="en-US"/>
               <a:t>Third level</a:t>
             </a:r>
           </a:p>
           <a:p>
             <a:pPr lvl="3"/>
             <a:r>
-              <a:rPr lang="en-US" smtClean="0"/>
+              <a:rPr lang="en-US"/>
               <a:t>Fourth level</a:t>
             </a:r>
           </a:p>
           <a:p>
             <a:pPr lvl="4"/>
             <a:r>
-              <a:rPr lang="en-US" smtClean="0"/>
+              <a:rPr lang="en-US"/>
               <a:t>Fifth level</a:t>
             </a:r>
             <a:endParaRPr lang="en-GB"/>
@@ -498,7 +528,7 @@
           <a:lstStyle/>
           <a:p>
             <a:r>
-              <a:rPr lang="en-US" smtClean="0"/>
+              <a:rPr lang="en-US"/>
               <a:t>Click to edit Master title style</a:t>
             </a:r>
             <a:endParaRPr lang="en-GB"/>
@@ -617,7 +647,7 @@
           </a:lstStyle>
           <a:p>
             <a:r>
-              <a:rPr lang="en-US" smtClean="0"/>
+              <a:rPr lang="en-US"/>
               <a:t>Click to edit Master subtitle style</a:t>
             </a:r>
             <a:endParaRPr lang="en-GB"/>
@@ -641,7 +671,7 @@
           <a:p>
             <a:fld id="{12F7E872-0053-49C4-B2E5-59B8432B4053}" type="datetimeFigureOut">
               <a:rPr lang="en-GB" smtClean="0"/>
-              <a:t>06/08/2018</a:t>
+              <a:t>16/01/2019</a:t>
             </a:fld>
             <a:endParaRPr lang="en-GB" dirty="0"/>
           </a:p>
@@ -735,7 +765,7 @@
           <a:lstStyle/>
           <a:p>
             <a:r>
-              <a:rPr lang="en-US" smtClean="0"/>
+              <a:rPr lang="en-US"/>
               <a:t>Click to edit Master title style</a:t>
             </a:r>
             <a:endParaRPr lang="en-GB"/>
@@ -759,35 +789,35 @@
           <a:p>
             <a:pPr lvl="0"/>
             <a:r>
-              <a:rPr lang="en-US" smtClean="0"/>
+              <a:rPr lang="en-US"/>
               <a:t>Click to edit Master text styles</a:t>
             </a:r>
           </a:p>
           <a:p>
             <a:pPr lvl="1"/>
             <a:r>
-              <a:rPr lang="en-US" smtClean="0"/>
+              <a:rPr lang="en-US"/>
               <a:t>Second level</a:t>
             </a:r>
           </a:p>
           <a:p>
             <a:pPr lvl="2"/>
             <a:r>
-              <a:rPr lang="en-US" smtClean="0"/>
+              <a:rPr lang="en-US"/>
               <a:t>Third level</a:t>
             </a:r>
           </a:p>
           <a:p>
             <a:pPr lvl="3"/>
             <a:r>
-              <a:rPr lang="en-US" smtClean="0"/>
+              <a:rPr lang="en-US"/>
               <a:t>Fourth level</a:t>
             </a:r>
           </a:p>
           <a:p>
             <a:pPr lvl="4"/>
             <a:r>
-              <a:rPr lang="en-US" smtClean="0"/>
+              <a:rPr lang="en-US"/>
               <a:t>Fifth level</a:t>
             </a:r>
             <a:endParaRPr lang="en-GB"/>
@@ -811,7 +841,7 @@
           <a:p>
             <a:fld id="{12F7E872-0053-49C4-B2E5-59B8432B4053}" type="datetimeFigureOut">
               <a:rPr lang="en-GB" smtClean="0"/>
-              <a:t>06/08/2018</a:t>
+              <a:t>16/01/2019</a:t>
             </a:fld>
             <a:endParaRPr lang="en-GB" dirty="0"/>
           </a:p>
@@ -910,7 +940,7 @@
           <a:lstStyle/>
           <a:p>
             <a:r>
-              <a:rPr lang="en-US" smtClean="0"/>
+              <a:rPr lang="en-US"/>
               <a:t>Click to edit Master title style</a:t>
             </a:r>
             <a:endParaRPr lang="en-GB"/>
@@ -939,35 +969,35 @@
           <a:p>
             <a:pPr lvl="0"/>
             <a:r>
-              <a:rPr lang="en-US" smtClean="0"/>
+              <a:rPr lang="en-US"/>
               <a:t>Click to edit Master text styles</a:t>
             </a:r>
           </a:p>
           <a:p>
             <a:pPr lvl="1"/>
             <a:r>
-              <a:rPr lang="en-US" smtClean="0"/>
+              <a:rPr lang="en-US"/>
               <a:t>Second level</a:t>
             </a:r>
           </a:p>
           <a:p>
             <a:pPr lvl="2"/>
             <a:r>
-              <a:rPr lang="en-US" smtClean="0"/>
+              <a:rPr lang="en-US"/>
               <a:t>Third level</a:t>
             </a:r>
           </a:p>
           <a:p>
             <a:pPr lvl="3"/>
             <a:r>
-              <a:rPr lang="en-US" smtClean="0"/>
+              <a:rPr lang="en-US"/>
               <a:t>Fourth level</a:t>
             </a:r>
           </a:p>
           <a:p>
             <a:pPr lvl="4"/>
             <a:r>
-              <a:rPr lang="en-US" smtClean="0"/>
+              <a:rPr lang="en-US"/>
               <a:t>Fifth level</a:t>
             </a:r>
             <a:endParaRPr lang="en-GB"/>
@@ -991,7 +1021,7 @@
           <a:p>
             <a:fld id="{12F7E872-0053-49C4-B2E5-59B8432B4053}" type="datetimeFigureOut">
               <a:rPr lang="en-GB" smtClean="0"/>
-              <a:t>06/08/2018</a:t>
+              <a:t>16/01/2019</a:t>
             </a:fld>
             <a:endParaRPr lang="en-GB" dirty="0"/>
           </a:p>
@@ -1085,7 +1115,7 @@
           <a:lstStyle/>
           <a:p>
             <a:r>
-              <a:rPr lang="en-US" smtClean="0"/>
+              <a:rPr lang="en-US"/>
               <a:t>Click to edit Master title style</a:t>
             </a:r>
             <a:endParaRPr lang="en-GB"/>
@@ -1109,35 +1139,35 @@
           <a:p>
             <a:pPr lvl="0"/>
             <a:r>
-              <a:rPr lang="en-US" smtClean="0"/>
+              <a:rPr lang="en-US"/>
               <a:t>Click to edit Master text styles</a:t>
             </a:r>
           </a:p>
           <a:p>
             <a:pPr lvl="1"/>
             <a:r>
-              <a:rPr lang="en-US" smtClean="0"/>
+              <a:rPr lang="en-US"/>
               <a:t>Second level</a:t>
             </a:r>
           </a:p>
           <a:p>
             <a:pPr lvl="2"/>
             <a:r>
-              <a:rPr lang="en-US" smtClean="0"/>
+              <a:rPr lang="en-US"/>
               <a:t>Third level</a:t>
             </a:r>
           </a:p>
           <a:p>
             <a:pPr lvl="3"/>
             <a:r>
-              <a:rPr lang="en-US" smtClean="0"/>
+              <a:rPr lang="en-US"/>
               <a:t>Fourth level</a:t>
             </a:r>
           </a:p>
           <a:p>
             <a:pPr lvl="4"/>
             <a:r>
-              <a:rPr lang="en-US" smtClean="0"/>
+              <a:rPr lang="en-US"/>
               <a:t>Fifth level</a:t>
             </a:r>
             <a:endParaRPr lang="en-GB"/>
@@ -1161,7 +1191,7 @@
           <a:p>
             <a:fld id="{12F7E872-0053-49C4-B2E5-59B8432B4053}" type="datetimeFigureOut">
               <a:rPr lang="en-GB" smtClean="0"/>
-              <a:t>06/08/2018</a:t>
+              <a:t>16/01/2019</a:t>
             </a:fld>
             <a:endParaRPr lang="en-GB" dirty="0"/>
           </a:p>
@@ -1264,7 +1294,7 @@
           </a:lstStyle>
           <a:p>
             <a:r>
-              <a:rPr lang="en-US" smtClean="0"/>
+              <a:rPr lang="en-US"/>
               <a:t>Click to edit Master title style</a:t>
             </a:r>
             <a:endParaRPr lang="en-GB"/>
@@ -1384,7 +1414,7 @@
           <a:p>
             <a:pPr lvl="0"/>
             <a:r>
-              <a:rPr lang="en-US" smtClean="0"/>
+              <a:rPr lang="en-US"/>
               <a:t>Click to edit Master text styles</a:t>
             </a:r>
           </a:p>
@@ -1407,7 +1437,7 @@
           <a:p>
             <a:fld id="{12F7E872-0053-49C4-B2E5-59B8432B4053}" type="datetimeFigureOut">
               <a:rPr lang="en-GB" smtClean="0"/>
-              <a:t>06/08/2018</a:t>
+              <a:t>16/01/2019</a:t>
             </a:fld>
             <a:endParaRPr lang="en-GB" dirty="0"/>
           </a:p>
@@ -1501,7 +1531,7 @@
           <a:lstStyle/>
           <a:p>
             <a:r>
-              <a:rPr lang="en-US" smtClean="0"/>
+              <a:rPr lang="en-US"/>
               <a:t>Click to edit Master title style</a:t>
             </a:r>
             <a:endParaRPr lang="en-GB"/>
@@ -1558,35 +1588,35 @@
           <a:p>
             <a:pPr lvl="0"/>
             <a:r>
-              <a:rPr lang="en-US" smtClean="0"/>
+              <a:rPr lang="en-US"/>
               <a:t>Click to edit Master text styles</a:t>
             </a:r>
           </a:p>
           <a:p>
             <a:pPr lvl="1"/>
             <a:r>
-              <a:rPr lang="en-US" smtClean="0"/>
+              <a:rPr lang="en-US"/>
               <a:t>Second level</a:t>
             </a:r>
           </a:p>
           <a:p>
             <a:pPr lvl="2"/>
             <a:r>
-              <a:rPr lang="en-US" smtClean="0"/>
+              <a:rPr lang="en-US"/>
               <a:t>Third level</a:t>
             </a:r>
           </a:p>
           <a:p>
             <a:pPr lvl="3"/>
             <a:r>
-              <a:rPr lang="en-US" smtClean="0"/>
+              <a:rPr lang="en-US"/>
               <a:t>Fourth level</a:t>
             </a:r>
           </a:p>
           <a:p>
             <a:pPr lvl="4"/>
             <a:r>
-              <a:rPr lang="en-US" smtClean="0"/>
+              <a:rPr lang="en-US"/>
               <a:t>Fifth level</a:t>
             </a:r>
             <a:endParaRPr lang="en-GB"/>
@@ -1643,35 +1673,35 @@
           <a:p>
             <a:pPr lvl="0"/>
             <a:r>
-              <a:rPr lang="en-US" smtClean="0"/>
+              <a:rPr lang="en-US"/>
               <a:t>Click to edit Master text styles</a:t>
             </a:r>
           </a:p>
           <a:p>
             <a:pPr lvl="1"/>
             <a:r>
-              <a:rPr lang="en-US" smtClean="0"/>
+              <a:rPr lang="en-US"/>
               <a:t>Second level</a:t>
             </a:r>
           </a:p>
           <a:p>
             <a:pPr lvl="2"/>
             <a:r>
-              <a:rPr lang="en-US" smtClean="0"/>
+              <a:rPr lang="en-US"/>
               <a:t>Third level</a:t>
             </a:r>
           </a:p>
           <a:p>
             <a:pPr lvl="3"/>
             <a:r>
-              <a:rPr lang="en-US" smtClean="0"/>
+              <a:rPr lang="en-US"/>
               <a:t>Fourth level</a:t>
             </a:r>
           </a:p>
           <a:p>
             <a:pPr lvl="4"/>
             <a:r>
-              <a:rPr lang="en-US" smtClean="0"/>
+              <a:rPr lang="en-US"/>
               <a:t>Fifth level</a:t>
             </a:r>
             <a:endParaRPr lang="en-GB"/>
@@ -1695,7 +1725,7 @@
           <a:p>
             <a:fld id="{12F7E872-0053-49C4-B2E5-59B8432B4053}" type="datetimeFigureOut">
               <a:rPr lang="en-GB" smtClean="0"/>
-              <a:t>06/08/2018</a:t>
+              <a:t>16/01/2019</a:t>
             </a:fld>
             <a:endParaRPr lang="en-GB" dirty="0"/>
           </a:p>
@@ -1798,7 +1828,7 @@
           </a:lstStyle>
           <a:p>
             <a:r>
-              <a:rPr lang="en-US" smtClean="0"/>
+              <a:rPr lang="en-US"/>
               <a:t>Click to edit Master title style</a:t>
             </a:r>
             <a:endParaRPr lang="en-GB"/>
@@ -1864,7 +1894,7 @@
           <a:p>
             <a:pPr lvl="0"/>
             <a:r>
-              <a:rPr lang="en-US" smtClean="0"/>
+              <a:rPr lang="en-US"/>
               <a:t>Click to edit Master text styles</a:t>
             </a:r>
           </a:p>
@@ -1920,35 +1950,35 @@
           <a:p>
             <a:pPr lvl="0"/>
             <a:r>
-              <a:rPr lang="en-US" smtClean="0"/>
+              <a:rPr lang="en-US"/>
               <a:t>Click to edit Master text styles</a:t>
             </a:r>
           </a:p>
           <a:p>
             <a:pPr lvl="1"/>
             <a:r>
-              <a:rPr lang="en-US" smtClean="0"/>
+              <a:rPr lang="en-US"/>
               <a:t>Second level</a:t>
             </a:r>
           </a:p>
           <a:p>
             <a:pPr lvl="2"/>
             <a:r>
-              <a:rPr lang="en-US" smtClean="0"/>
+              <a:rPr lang="en-US"/>
               <a:t>Third level</a:t>
             </a:r>
           </a:p>
           <a:p>
             <a:pPr lvl="3"/>
             <a:r>
-              <a:rPr lang="en-US" smtClean="0"/>
+              <a:rPr lang="en-US"/>
               <a:t>Fourth level</a:t>
             </a:r>
           </a:p>
           <a:p>
             <a:pPr lvl="4"/>
             <a:r>
-              <a:rPr lang="en-US" smtClean="0"/>
+              <a:rPr lang="en-US"/>
               <a:t>Fifth level</a:t>
             </a:r>
             <a:endParaRPr lang="en-GB"/>
@@ -2014,7 +2044,7 @@
           <a:p>
             <a:pPr lvl="0"/>
             <a:r>
-              <a:rPr lang="en-US" smtClean="0"/>
+              <a:rPr lang="en-US"/>
               <a:t>Click to edit Master text styles</a:t>
             </a:r>
           </a:p>
@@ -2070,35 +2100,35 @@
           <a:p>
             <a:pPr lvl="0"/>
             <a:r>
-              <a:rPr lang="en-US" smtClean="0"/>
+              <a:rPr lang="en-US"/>
               <a:t>Click to edit Master text styles</a:t>
             </a:r>
           </a:p>
           <a:p>
             <a:pPr lvl="1"/>
             <a:r>
-              <a:rPr lang="en-US" smtClean="0"/>
+              <a:rPr lang="en-US"/>
               <a:t>Second level</a:t>
             </a:r>
           </a:p>
           <a:p>
             <a:pPr lvl="2"/>
             <a:r>
-              <a:rPr lang="en-US" smtClean="0"/>
+              <a:rPr lang="en-US"/>
               <a:t>Third level</a:t>
             </a:r>
           </a:p>
           <a:p>
             <a:pPr lvl="3"/>
             <a:r>
-              <a:rPr lang="en-US" smtClean="0"/>
+              <a:rPr lang="en-US"/>
               <a:t>Fourth level</a:t>
             </a:r>
           </a:p>
           <a:p>
             <a:pPr lvl="4"/>
             <a:r>
-              <a:rPr lang="en-US" smtClean="0"/>
+              <a:rPr lang="en-US"/>
               <a:t>Fifth level</a:t>
             </a:r>
             <a:endParaRPr lang="en-GB"/>
@@ -2122,7 +2152,7 @@
           <a:p>
             <a:fld id="{12F7E872-0053-49C4-B2E5-59B8432B4053}" type="datetimeFigureOut">
               <a:rPr lang="en-GB" smtClean="0"/>
-              <a:t>06/08/2018</a:t>
+              <a:t>16/01/2019</a:t>
             </a:fld>
             <a:endParaRPr lang="en-GB" dirty="0"/>
           </a:p>
@@ -2216,7 +2246,7 @@
           <a:lstStyle/>
           <a:p>
             <a:r>
-              <a:rPr lang="en-US" smtClean="0"/>
+              <a:rPr lang="en-US"/>
               <a:t>Click to edit Master title style</a:t>
             </a:r>
             <a:endParaRPr lang="en-GB"/>
@@ -2240,7 +2270,7 @@
           <a:p>
             <a:fld id="{12F7E872-0053-49C4-B2E5-59B8432B4053}" type="datetimeFigureOut">
               <a:rPr lang="en-GB" smtClean="0"/>
-              <a:t>06/08/2018</a:t>
+              <a:t>16/01/2019</a:t>
             </a:fld>
             <a:endParaRPr lang="en-GB" dirty="0"/>
           </a:p>
@@ -2335,7 +2365,7 @@
           <a:p>
             <a:fld id="{12F7E872-0053-49C4-B2E5-59B8432B4053}" type="datetimeFigureOut">
               <a:rPr lang="en-GB" smtClean="0"/>
-              <a:t>06/08/2018</a:t>
+              <a:t>16/01/2019</a:t>
             </a:fld>
             <a:endParaRPr lang="en-GB" dirty="0"/>
           </a:p>
@@ -2438,7 +2468,7 @@
           </a:lstStyle>
           <a:p>
             <a:r>
-              <a:rPr lang="en-US" smtClean="0"/>
+              <a:rPr lang="en-US"/>
               <a:t>Click to edit Master title style</a:t>
             </a:r>
             <a:endParaRPr lang="en-GB"/>
@@ -2495,35 +2525,35 @@
           <a:p>
             <a:pPr lvl="0"/>
             <a:r>
-              <a:rPr lang="en-US" smtClean="0"/>
+              <a:rPr lang="en-US"/>
               <a:t>Click to edit Master text styles</a:t>
             </a:r>
           </a:p>
           <a:p>
             <a:pPr lvl="1"/>
             <a:r>
-              <a:rPr lang="en-US" smtClean="0"/>
+              <a:rPr lang="en-US"/>
               <a:t>Second level</a:t>
             </a:r>
           </a:p>
           <a:p>
             <a:pPr lvl="2"/>
             <a:r>
-              <a:rPr lang="en-US" smtClean="0"/>
+              <a:rPr lang="en-US"/>
               <a:t>Third level</a:t>
             </a:r>
           </a:p>
           <a:p>
             <a:pPr lvl="3"/>
             <a:r>
-              <a:rPr lang="en-US" smtClean="0"/>
+              <a:rPr lang="en-US"/>
               <a:t>Fourth level</a:t>
             </a:r>
           </a:p>
           <a:p>
             <a:pPr lvl="4"/>
             <a:r>
-              <a:rPr lang="en-US" smtClean="0"/>
+              <a:rPr lang="en-US"/>
               <a:t>Fifth level</a:t>
             </a:r>
             <a:endParaRPr lang="en-GB"/>
@@ -2589,7 +2619,7 @@
           <a:p>
             <a:pPr lvl="0"/>
             <a:r>
-              <a:rPr lang="en-US" smtClean="0"/>
+              <a:rPr lang="en-US"/>
               <a:t>Click to edit Master text styles</a:t>
             </a:r>
           </a:p>
@@ -2612,7 +2642,7 @@
           <a:p>
             <a:fld id="{12F7E872-0053-49C4-B2E5-59B8432B4053}" type="datetimeFigureOut">
               <a:rPr lang="en-GB" smtClean="0"/>
-              <a:t>06/08/2018</a:t>
+              <a:t>16/01/2019</a:t>
             </a:fld>
             <a:endParaRPr lang="en-GB" dirty="0"/>
           </a:p>
@@ -2715,7 +2745,7 @@
           </a:lstStyle>
           <a:p>
             <a:r>
-              <a:rPr lang="en-US" smtClean="0"/>
+              <a:rPr lang="en-US"/>
               <a:t>Click to edit Master title style</a:t>
             </a:r>
             <a:endParaRPr lang="en-GB"/>
@@ -2842,7 +2872,7 @@
           <a:p>
             <a:pPr lvl="0"/>
             <a:r>
-              <a:rPr lang="en-US" smtClean="0"/>
+              <a:rPr lang="en-US"/>
               <a:t>Click to edit Master text styles</a:t>
             </a:r>
           </a:p>
@@ -2865,7 +2895,7 @@
           <a:p>
             <a:fld id="{12F7E872-0053-49C4-B2E5-59B8432B4053}" type="datetimeFigureOut">
               <a:rPr lang="en-GB" smtClean="0"/>
-              <a:t>06/08/2018</a:t>
+              <a:t>16/01/2019</a:t>
             </a:fld>
             <a:endParaRPr lang="en-GB" dirty="0"/>
           </a:p>
@@ -2974,7 +3004,7 @@
           <a:lstStyle/>
           <a:p>
             <a:r>
-              <a:rPr lang="en-US" smtClean="0"/>
+              <a:rPr lang="en-US"/>
               <a:t>Click to edit Master title style</a:t>
             </a:r>
             <a:endParaRPr lang="en-GB"/>
@@ -3008,35 +3038,35 @@
           <a:p>
             <a:pPr lvl="0"/>
             <a:r>
-              <a:rPr lang="en-US" smtClean="0"/>
+              <a:rPr lang="en-US"/>
               <a:t>Click to edit Master text styles</a:t>
             </a:r>
           </a:p>
           <a:p>
             <a:pPr lvl="1"/>
             <a:r>
-              <a:rPr lang="en-US" smtClean="0"/>
+              <a:rPr lang="en-US"/>
               <a:t>Second level</a:t>
             </a:r>
           </a:p>
           <a:p>
             <a:pPr lvl="2"/>
             <a:r>
-              <a:rPr lang="en-US" smtClean="0"/>
+              <a:rPr lang="en-US"/>
               <a:t>Third level</a:t>
             </a:r>
           </a:p>
           <a:p>
             <a:pPr lvl="3"/>
             <a:r>
-              <a:rPr lang="en-US" smtClean="0"/>
+              <a:rPr lang="en-US"/>
               <a:t>Fourth level</a:t>
             </a:r>
           </a:p>
           <a:p>
             <a:pPr lvl="4"/>
             <a:r>
-              <a:rPr lang="en-US" smtClean="0"/>
+              <a:rPr lang="en-US"/>
               <a:t>Fifth level</a:t>
             </a:r>
             <a:endParaRPr lang="en-GB"/>
@@ -3078,7 +3108,7 @@
           <a:p>
             <a:fld id="{12F7E872-0053-49C4-B2E5-59B8432B4053}" type="datetimeFigureOut">
               <a:rPr lang="en-GB" smtClean="0"/>
-              <a:t>06/08/2018</a:t>
+              <a:t>16/01/2019</a:t>
             </a:fld>
             <a:endParaRPr lang="en-GB" dirty="0"/>
           </a:p>
@@ -3725,7 +3755,7 @@
             <a:lstStyle/>
             <a:p>
               <a:r>
-                <a:rPr lang="en-US" sz="800" dirty="0" smtClean="0">
+                <a:rPr lang="en-US" sz="800" dirty="0">
                   <a:solidFill>
                     <a:schemeClr val="tx1"/>
                   </a:solidFill>
@@ -3780,7 +3810,7 @@
             <a:lstStyle/>
             <a:p>
               <a:r>
-                <a:rPr lang="en-US" sz="800" dirty="0" smtClean="0">
+                <a:rPr lang="en-US" sz="800" dirty="0">
                   <a:solidFill>
                     <a:schemeClr val="tx1"/>
                   </a:solidFill>
@@ -3897,7 +3927,7 @@
             <a:lstStyle/>
             <a:p>
               <a:r>
-                <a:rPr lang="en-US" sz="800" b="1" dirty="0" smtClean="0">
+                <a:rPr lang="en-US" sz="800" b="1" dirty="0">
                   <a:solidFill>
                     <a:schemeClr val="tx1">
                       <a:lumMod val="65000"/>
@@ -3908,7 +3938,7 @@
                 <a:t>Node </a:t>
               </a:r>
               <a:r>
-                <a:rPr lang="en-US" sz="800" b="1" baseline="30000" dirty="0" smtClean="0">
+                <a:rPr lang="en-US" sz="800" b="1" baseline="30000" dirty="0">
                   <a:solidFill>
                     <a:schemeClr val="tx1">
                       <a:lumMod val="65000"/>
@@ -4049,14 +4079,14 @@
           <a:lstStyle/>
           <a:p>
             <a:r>
-              <a:rPr lang="en-US" sz="1200" dirty="0" smtClean="0"/>
-              <a:t>Digital Delta V2</a:t>
+              <a:rPr lang="en-US" sz="1200" dirty="0"/>
+              <a:t>Digital Delta V2.0.1</a:t>
             </a:r>
             <a:br>
-              <a:rPr lang="en-US" sz="1200" dirty="0" smtClean="0"/>
+              <a:rPr lang="en-US" sz="1200" dirty="0"/>
             </a:br>
             <a:r>
-              <a:rPr lang="en-US" sz="1200" dirty="0" smtClean="0"/>
+              <a:rPr lang="en-US" sz="1200" dirty="0"/>
               <a:t>REST-API resource types</a:t>
             </a:r>
             <a:endParaRPr lang="en-GB" sz="1200" dirty="0"/>
@@ -4230,7 +4260,7 @@
             <a:lstStyle/>
             <a:p>
               <a:r>
-                <a:rPr lang="en-US" sz="800" b="1" dirty="0" smtClean="0">
+                <a:rPr lang="en-US" sz="800" b="1" dirty="0">
                   <a:solidFill>
                     <a:schemeClr val="tx1"/>
                   </a:solidFill>
@@ -4300,7 +4330,7 @@
             <a:lstStyle/>
             <a:p>
               <a:r>
-                <a:rPr lang="en-US" sz="800" dirty="0" smtClean="0">
+                <a:rPr lang="en-US" sz="800" dirty="0">
                   <a:solidFill>
                     <a:schemeClr val="tx1"/>
                   </a:solidFill>
@@ -4358,7 +4388,7 @@
             <a:lstStyle/>
             <a:p>
               <a:r>
-                <a:rPr lang="en-US" sz="800" b="1" dirty="0" smtClean="0">
+                <a:rPr lang="en-US" sz="800" b="1" dirty="0">
                   <a:solidFill>
                     <a:schemeClr val="tx1"/>
                   </a:solidFill>
@@ -4452,21 +4482,21 @@
           <a:lstStyle/>
           <a:p>
             <a:r>
-              <a:rPr lang="en-US" sz="800" dirty="0" smtClean="0"/>
+              <a:rPr lang="en-US" sz="800" dirty="0"/>
               <a:t>  *) Node: The DD is a distrubited system.</a:t>
             </a:r>
             <a:br>
-              <a:rPr lang="en-US" sz="800" dirty="0" smtClean="0"/>
+              <a:rPr lang="en-US" sz="800" dirty="0"/>
             </a:br>
             <a:r>
-              <a:rPr lang="en-US" sz="800" dirty="0" smtClean="0"/>
+              <a:rPr lang="en-US" sz="800" dirty="0"/>
               <a:t>       The node specificies from which url</a:t>
             </a:r>
             <a:br>
-              <a:rPr lang="en-US" sz="800" dirty="0" smtClean="0"/>
+              <a:rPr lang="en-US" sz="800" dirty="0"/>
             </a:br>
             <a:r>
-              <a:rPr lang="en-US" sz="800" dirty="0" smtClean="0"/>
+              <a:rPr lang="en-US" sz="800" dirty="0"/>
               <a:t>        the data has been retrieved</a:t>
             </a:r>
             <a:endParaRPr lang="en-GB" sz="800" dirty="0"/>
@@ -4496,7 +4526,7 @@
           <a:lstStyle/>
           <a:p>
             <a:r>
-              <a:rPr lang="en-US" sz="1100" i="1" dirty="0" smtClean="0"/>
+              <a:rPr lang="en-US" sz="1100" i="1" dirty="0"/>
               <a:t>Legend:</a:t>
             </a:r>
             <a:endParaRPr lang="en-GB" sz="1100" i="1" dirty="0"/>
@@ -4881,7 +4911,7 @@
             <a:lstStyle/>
             <a:p>
               <a:r>
-                <a:rPr lang="en-US" sz="800" dirty="0" smtClean="0">
+                <a:rPr lang="en-US" sz="800" dirty="0">
                   <a:solidFill>
                     <a:schemeClr val="bg1">
                       <a:lumMod val="50000"/>
@@ -4940,7 +4970,7 @@
             <a:lstStyle/>
             <a:p>
               <a:r>
-                <a:rPr lang="en-US" sz="800" dirty="0" smtClean="0">
+                <a:rPr lang="en-US" sz="800" dirty="0">
                   <a:solidFill>
                     <a:schemeClr val="bg1">
                       <a:lumMod val="50000"/>
@@ -5002,7 +5032,7 @@
             <a:lstStyle/>
             <a:p>
               <a:r>
-                <a:rPr lang="en-US" sz="800" b="1" dirty="0" smtClean="0">
+                <a:rPr lang="en-US" sz="800" b="1" dirty="0">
                   <a:solidFill>
                     <a:schemeClr val="tx1"/>
                   </a:solidFill>
@@ -5057,7 +5087,7 @@
             <a:lstStyle/>
             <a:p>
               <a:r>
-                <a:rPr lang="en-US" sz="800" dirty="0" smtClean="0">
+                <a:rPr lang="en-US" sz="800" dirty="0">
                   <a:solidFill>
                     <a:schemeClr val="bg1">
                       <a:lumMod val="50000"/>
@@ -5348,7 +5378,7 @@
             <a:lstStyle/>
             <a:p>
               <a:r>
-                <a:rPr lang="en-US" sz="800" b="1" dirty="0" smtClean="0">
+                <a:rPr lang="en-US" sz="800" b="1" dirty="0">
                   <a:solidFill>
                     <a:schemeClr val="tx1"/>
                   </a:solidFill>
@@ -5418,7 +5448,7 @@
             <a:lstStyle/>
             <a:p>
               <a:r>
-                <a:rPr lang="en-US" sz="800" dirty="0" smtClean="0">
+                <a:rPr lang="en-US" sz="800" dirty="0">
                   <a:solidFill>
                     <a:schemeClr val="tx1"/>
                   </a:solidFill>
@@ -5599,15 +5629,7 @@
                     <a:schemeClr val="tx1"/>
                   </a:solidFill>
                 </a:rPr>
-                <a:t>S</a:t>
-              </a:r>
-              <a:r>
-                <a:rPr lang="en-US" sz="800" b="1" dirty="0" smtClean="0">
-                  <a:solidFill>
-                    <a:schemeClr val="tx1"/>
-                  </a:solidFill>
-                </a:rPr>
-                <a:t>ource</a:t>
+                <a:t>Source</a:t>
               </a:r>
               <a:endParaRPr lang="en-GB" sz="800" b="1" baseline="30000" dirty="0">
                 <a:solidFill>
@@ -5657,7 +5679,7 @@
             <a:lstStyle/>
             <a:p>
               <a:r>
-                <a:rPr lang="en-US" sz="800" dirty="0" smtClean="0">
+                <a:rPr lang="en-US" sz="800" dirty="0">
                   <a:solidFill>
                     <a:schemeClr val="bg1">
                       <a:lumMod val="50000"/>
@@ -5716,7 +5738,7 @@
             <a:lstStyle/>
             <a:p>
               <a:r>
-                <a:rPr lang="en-US" sz="800" dirty="0" smtClean="0">
+                <a:rPr lang="en-US" sz="800" dirty="0">
                   <a:solidFill>
                     <a:schemeClr val="tx1"/>
                   </a:solidFill>
@@ -6008,7 +6030,7 @@
             <a:lstStyle/>
             <a:p>
               <a:r>
-                <a:rPr lang="en-US" sz="800" b="1" dirty="0" smtClean="0">
+                <a:rPr lang="en-US" sz="800" b="1" dirty="0">
                   <a:solidFill>
                     <a:schemeClr val="tx1"/>
                   </a:solidFill>
@@ -6167,7 +6189,7 @@
           <a:lstStyle/>
           <a:p>
             <a:r>
-              <a:rPr lang="en-US" sz="800" b="1" dirty="0" smtClean="0">
+              <a:rPr lang="en-US" sz="800" b="1" dirty="0">
                 <a:solidFill>
                   <a:schemeClr val="tx1"/>
                 </a:solidFill>
@@ -6277,7 +6299,7 @@
           <a:lstStyle/>
           <a:p>
             <a:r>
-              <a:rPr lang="en-US" sz="800" dirty="0" smtClean="0">
+              <a:rPr lang="en-US" sz="800" dirty="0">
                 <a:solidFill>
                   <a:schemeClr val="bg1">
                     <a:lumMod val="50000"/>
@@ -6471,7 +6493,7 @@
             <a:lstStyle/>
             <a:p>
               <a:r>
-                <a:rPr lang="en-US" sz="800" b="1" dirty="0" smtClean="0">
+                <a:rPr lang="en-US" sz="800" b="1" dirty="0">
                   <a:solidFill>
                     <a:schemeClr val="tx1"/>
                   </a:solidFill>
@@ -6886,7 +6908,7 @@
             <a:lstStyle/>
             <a:p>
               <a:r>
-                <a:rPr lang="en-US" sz="800" b="1" dirty="0" smtClean="0">
+                <a:rPr lang="en-US" sz="800" b="1" dirty="0">
                   <a:solidFill>
                     <a:schemeClr val="tx1"/>
                   </a:solidFill>
@@ -7289,7 +7311,7 @@
             <a:lstStyle/>
             <a:p>
               <a:r>
-                <a:rPr lang="en-US" sz="800" b="1" dirty="0" smtClean="0">
+                <a:rPr lang="en-US" sz="800" b="1" dirty="0">
                   <a:solidFill>
                     <a:schemeClr val="tx1"/>
                   </a:solidFill>
@@ -7344,7 +7366,7 @@
             <a:lstStyle/>
             <a:p>
               <a:r>
-                <a:rPr lang="en-US" sz="800" dirty="0" smtClean="0">
+                <a:rPr lang="en-US" sz="800" dirty="0">
                   <a:solidFill>
                     <a:schemeClr val="tx1"/>
                   </a:solidFill>
@@ -7779,7 +7801,7 @@
             <a:lstStyle/>
             <a:p>
               <a:r>
-                <a:rPr lang="en-US" sz="800" i="1" dirty="0" smtClean="0">
+                <a:rPr lang="en-US" sz="800" i="1" dirty="0">
                   <a:solidFill>
                     <a:schemeClr val="tx1"/>
                   </a:solidFill>
@@ -7834,7 +7856,7 @@
             <a:lstStyle/>
             <a:p>
               <a:r>
-                <a:rPr lang="en-US" sz="800" i="1" dirty="0" smtClean="0">
+                <a:rPr lang="en-US" sz="800" i="1" dirty="0">
                   <a:solidFill>
                     <a:schemeClr val="tx1"/>
                   </a:solidFill>
@@ -7889,7 +7911,7 @@
             <a:lstStyle/>
             <a:p>
               <a:r>
-                <a:rPr lang="en-US" sz="800" dirty="0" smtClean="0">
+                <a:rPr lang="en-US" sz="800" dirty="0">
                   <a:solidFill>
                     <a:schemeClr val="tx1"/>
                   </a:solidFill>
@@ -7944,7 +7966,7 @@
             <a:lstStyle/>
             <a:p>
               <a:r>
-                <a:rPr lang="en-US" sz="800" dirty="0" smtClean="0">
+                <a:rPr lang="en-US" sz="800" dirty="0">
                   <a:solidFill>
                     <a:schemeClr val="tx1"/>
                   </a:solidFill>
@@ -8057,7 +8079,7 @@
             <a:lstStyle/>
             <a:p>
               <a:r>
-                <a:rPr lang="en-US" sz="800" b="1" dirty="0" smtClean="0">
+                <a:rPr lang="en-US" sz="800" b="1" dirty="0">
                   <a:solidFill>
                     <a:schemeClr val="tx1"/>
                   </a:solidFill>
@@ -8112,7 +8134,7 @@
             <a:lstStyle/>
             <a:p>
               <a:r>
-                <a:rPr lang="en-US" sz="800" dirty="0" smtClean="0">
+                <a:rPr lang="en-US" sz="800" dirty="0">
                   <a:solidFill>
                     <a:schemeClr val="bg1">
                       <a:lumMod val="50000"/>
@@ -8285,7 +8307,7 @@
             <a:lstStyle/>
             <a:p>
               <a:r>
-                <a:rPr lang="en-US" sz="800" dirty="0" smtClean="0">
+                <a:rPr lang="en-US" sz="800" dirty="0">
                   <a:solidFill>
                     <a:schemeClr val="tx1"/>
                   </a:solidFill>
@@ -8340,7 +8362,7 @@
             <a:lstStyle/>
             <a:p>
               <a:r>
-                <a:rPr lang="en-US" sz="800" i="1" dirty="0" smtClean="0">
+                <a:rPr lang="en-US" sz="800" i="1" dirty="0">
                   <a:solidFill>
                     <a:schemeClr val="tx1"/>
                   </a:solidFill>
@@ -8395,7 +8417,7 @@
             <a:lstStyle/>
             <a:p>
               <a:r>
-                <a:rPr lang="en-US" sz="800" dirty="0" smtClean="0">
+                <a:rPr lang="en-US" sz="800" dirty="0">
                   <a:solidFill>
                     <a:schemeClr val="bg1">
                       <a:lumMod val="50000"/>
@@ -8454,7 +8476,7 @@
             <a:lstStyle/>
             <a:p>
               <a:r>
-                <a:rPr lang="en-US" sz="800" dirty="0" smtClean="0">
+                <a:rPr lang="en-US" sz="800" dirty="0">
                   <a:solidFill>
                     <a:schemeClr val="bg1">
                       <a:lumMod val="50000"/>
@@ -8513,7 +8535,7 @@
             <a:lstStyle/>
             <a:p>
               <a:r>
-                <a:rPr lang="en-US" sz="800" dirty="0" smtClean="0">
+                <a:rPr lang="en-US" sz="800" dirty="0">
                   <a:solidFill>
                     <a:schemeClr val="bg1">
                       <a:lumMod val="50000"/>
@@ -8587,7 +8609,7 @@
             <a:lstStyle/>
             <a:p>
               <a:r>
-                <a:rPr lang="en-US" sz="800" dirty="0" smtClean="0">
+                <a:rPr lang="en-US" sz="800" dirty="0">
                   <a:solidFill>
                     <a:schemeClr val="tx1"/>
                   </a:solidFill>
@@ -8642,7 +8664,7 @@
             <a:lstStyle/>
             <a:p>
               <a:r>
-                <a:rPr lang="en-US" sz="800" i="1" dirty="0" smtClean="0">
+                <a:rPr lang="en-US" sz="800" i="1" dirty="0">
                   <a:solidFill>
                     <a:schemeClr val="tx1"/>
                   </a:solidFill>
@@ -8700,7 +8722,7 @@
             <a:lstStyle/>
             <a:p>
               <a:r>
-                <a:rPr lang="en-US" sz="800" b="1" dirty="0" smtClean="0">
+                <a:rPr lang="en-US" sz="800" b="1" dirty="0">
                   <a:solidFill>
                     <a:schemeClr val="tx1"/>
                   </a:solidFill>
@@ -8821,17 +8843,7 @@
                     </a:schemeClr>
                   </a:solidFill>
                 </a:rPr>
-                <a:t>o</a:t>
-              </a:r>
-              <a:r>
-                <a:rPr lang="en-US" sz="800" i="1" dirty="0" smtClean="0">
-                  <a:solidFill>
-                    <a:schemeClr val="bg1">
-                      <a:lumMod val="50000"/>
-                    </a:schemeClr>
-                  </a:solidFill>
-                </a:rPr>
-                <a:t>ptional, used only by DD-OPER</a:t>
+                <a:t>optional, used only by DD-OPER</a:t>
               </a:r>
               <a:endParaRPr lang="en-GB" sz="800" i="1" dirty="0">
                 <a:solidFill>
@@ -8898,14 +8910,14 @@
             <a:lstStyle/>
             <a:p>
               <a:r>
-                <a:rPr lang="en-US" sz="800" dirty="0" smtClean="0">
+                <a:rPr lang="en-US" sz="800" dirty="0">
                   <a:solidFill>
                     <a:schemeClr val="bg1">
                       <a:lumMod val="50000"/>
                     </a:schemeClr>
                   </a:solidFill>
                 </a:rPr>
-                <a:t>crs</a:t>
+                <a:t>crsName</a:t>
               </a:r>
               <a:endParaRPr lang="en-GB" sz="800" dirty="0">
                 <a:solidFill>
@@ -9302,7 +9314,7 @@
             <a:lstStyle/>
             <a:p>
               <a:r>
-                <a:rPr lang="en-US" sz="800" b="1" dirty="0" smtClean="0">
+                <a:rPr lang="en-US" sz="800" b="1" dirty="0">
                   <a:solidFill>
                     <a:schemeClr val="tx1"/>
                   </a:solidFill>
@@ -9310,28 +9322,12 @@
                 <a:t>Location</a:t>
               </a:r>
               <a:r>
-                <a:rPr lang="en-US" sz="700" dirty="0" smtClean="0">
+                <a:rPr lang="en-US" sz="700" dirty="0">
                   <a:solidFill>
                     <a:schemeClr val="tx1"/>
                   </a:solidFill>
                 </a:rPr>
-                <a:t> (</a:t>
-              </a:r>
-              <a:r>
-                <a:rPr lang="en-US" sz="700" dirty="0" smtClean="0">
-                  <a:solidFill>
-                    <a:schemeClr val="tx1"/>
-                  </a:solidFill>
-                </a:rPr>
-                <a:t>GeoJSON</a:t>
-              </a:r>
-              <a:r>
-                <a:rPr lang="en-US" sz="700" dirty="0" smtClean="0">
-                  <a:solidFill>
-                    <a:schemeClr val="tx1"/>
-                  </a:solidFill>
-                </a:rPr>
-                <a:t>)</a:t>
+                <a:t> (GeoJSON)</a:t>
               </a:r>
               <a:endParaRPr lang="en-GB" sz="800" dirty="0">
                 <a:solidFill>
@@ -9381,7 +9377,7 @@
             <a:lstStyle/>
             <a:p>
               <a:r>
-                <a:rPr lang="en-US" sz="800" dirty="0" smtClean="0">
+                <a:rPr lang="en-US" sz="800" dirty="0">
                   <a:solidFill>
                     <a:schemeClr val="tx1"/>
                   </a:solidFill>
@@ -9389,7 +9385,7 @@
                 <a:t>type: </a:t>
               </a:r>
               <a:r>
-                <a:rPr lang="en-US" sz="700" dirty="0" smtClean="0">
+                <a:rPr lang="en-US" sz="700" dirty="0">
                   <a:solidFill>
                     <a:schemeClr val="tx1"/>
                   </a:solidFill>
@@ -9444,7 +9440,7 @@
             <a:lstStyle/>
             <a:p>
               <a:r>
-                <a:rPr lang="en-US" sz="800" dirty="0" smtClean="0">
+                <a:rPr lang="en-US" sz="800" dirty="0">
                   <a:solidFill>
                     <a:schemeClr val="tx1"/>
                   </a:solidFill>
@@ -9499,20 +9495,12 @@
             <a:lstStyle/>
             <a:p>
               <a:r>
-                <a:rPr lang="en-US" sz="800" dirty="0" smtClean="0">
+                <a:rPr lang="en-US" sz="800" dirty="0">
                   <a:solidFill>
                     <a:schemeClr val="tx1"/>
                   </a:solidFill>
                 </a:rPr>
-                <a:t>p</a:t>
-              </a:r>
-              <a:r>
-                <a:rPr lang="en-US" sz="800" dirty="0" smtClean="0">
-                  <a:solidFill>
-                    <a:schemeClr val="tx1"/>
-                  </a:solidFill>
-                </a:rPr>
-                <a:t>roperties:</a:t>
+                <a:t>properties:</a:t>
               </a:r>
               <a:endParaRPr lang="en-GB" sz="800" dirty="0">
                 <a:solidFill>
@@ -9562,7 +9550,7 @@
             <a:lstStyle/>
             <a:p>
               <a:r>
-                <a:rPr lang="en-US" sz="800" dirty="0" smtClean="0">
+                <a:rPr lang="en-US" sz="800" dirty="0">
                   <a:solidFill>
                     <a:schemeClr val="tx1"/>
                   </a:solidFill>
@@ -9570,7 +9558,7 @@
                 <a:t>type:  </a:t>
               </a:r>
               <a:r>
-                <a:rPr lang="en-US" sz="700" dirty="0" smtClean="0">
+                <a:rPr lang="en-US" sz="700" dirty="0">
                   <a:solidFill>
                     <a:schemeClr val="tx1"/>
                   </a:solidFill>
@@ -9625,7 +9613,7 @@
             <a:lstStyle/>
             <a:p>
               <a:r>
-                <a:rPr lang="en-US" sz="800" dirty="0" smtClean="0">
+                <a:rPr lang="en-US" sz="800" dirty="0">
                   <a:solidFill>
                     <a:schemeClr val="tx1"/>
                   </a:solidFill>
@@ -9680,7 +9668,7 @@
             <a:lstStyle/>
             <a:p>
               <a:r>
-                <a:rPr lang="en-US" sz="800" i="1" dirty="0" smtClean="0">
+                <a:rPr lang="en-US" sz="800" i="1" dirty="0">
                   <a:solidFill>
                     <a:schemeClr val="bg1">
                       <a:lumMod val="50000"/>
@@ -9739,7 +9727,7 @@
             <a:lstStyle/>
             <a:p>
               <a:r>
-                <a:rPr lang="en-US" sz="800" i="1" dirty="0" smtClean="0">
+                <a:rPr lang="en-US" sz="800" i="1" dirty="0">
                   <a:solidFill>
                     <a:schemeClr val="bg1">
                       <a:lumMod val="50000"/>
@@ -9798,7 +9786,7 @@
             <a:lstStyle/>
             <a:p>
               <a:r>
-                <a:rPr lang="en-US" sz="800" i="1" dirty="0" smtClean="0">
+                <a:rPr lang="en-US" sz="800" i="1" dirty="0">
                   <a:solidFill>
                     <a:schemeClr val="bg1">
                       <a:lumMod val="50000"/>
@@ -9858,7 +9846,7 @@
           <a:lstStyle/>
           <a:p>
             <a:r>
-              <a:rPr lang="en-US" sz="800" i="1" dirty="0" smtClean="0">
+              <a:rPr lang="en-US" sz="800" i="1" dirty="0">
                 <a:solidFill>
                   <a:schemeClr val="bg1">
                     <a:lumMod val="50000"/>

</xml_diff>